<commit_message>
app workflow image updated in praes
</commit_message>
<xml_diff>
--- a/hausarbeit/praes/Implementierung eines Source-To-Source Compilers zur Optimierung von CSS-Dateien.pptx
+++ b/hausarbeit/praes/Implementierung eines Source-To-Source Compilers zur Optimierung von CSS-Dateien.pptx
@@ -4350,11 +4350,7 @@
             </a:r>
             <a:r>
               <a:rPr lang="de-DE" dirty="0" smtClean="0"/>
-              <a:t>Verringerung der Ladezeit durch Reduktion von Dateigröße </a:t>
-            </a:r>
-            <a:r>
-              <a:rPr lang="de-DE" smtClean="0"/>
-              <a:t>und Overhead</a:t>
+              <a:t>Verringerung der Ladezeit durch Reduktion von Dateigröße und Overhead</a:t>
             </a:r>
             <a:endParaRPr lang="de-DE" dirty="0" smtClean="0"/>
           </a:p>
@@ -5455,13 +5451,11 @@
       </p:sp>
       <p:pic>
         <p:nvPicPr>
-          <p:cNvPr id="4" name="Inhaltsplatzhalter 3"/>
+          <p:cNvPr id="3" name="Bild 2" descr="app-workflow.png"/>
           <p:cNvPicPr>
-            <a:picLocks noGrp="1" noChangeAspect="1"/>
+            <a:picLocks noChangeAspect="1"/>
           </p:cNvPicPr>
-          <p:nvPr>
-            <p:ph idx="1"/>
-          </p:nvPr>
+          <p:nvPr/>
         </p:nvPicPr>
         <p:blipFill>
           <a:blip r:embed="rId2">
@@ -5477,24 +5471,33 @@
         </p:blipFill>
         <p:spPr>
           <a:xfrm>
-            <a:off x="1248682" y="2728755"/>
-            <a:ext cx="9754961" cy="2257740"/>
+            <a:off x="1099268" y="2360047"/>
+            <a:ext cx="10032152" cy="2321894"/>
           </a:xfrm>
           <a:prstGeom prst="rect">
             <a:avLst/>
           </a:prstGeom>
-          <a:ln>
-            <a:noFill/>
-          </a:ln>
-          <a:effectLst>
-            <a:outerShdw blurRad="190500" algn="tl" rotWithShape="0">
-              <a:srgbClr val="000000">
-                <a:alpha val="70000"/>
-              </a:srgbClr>
-            </a:outerShdw>
-          </a:effectLst>
         </p:spPr>
       </p:pic>
+      <p:sp>
+        <p:nvSpPr>
+          <p:cNvPr id="5" name="Inhaltsplatzhalter 4"/>
+          <p:cNvSpPr>
+            <a:spLocks noGrp="1"/>
+          </p:cNvSpPr>
+          <p:nvPr>
+            <p:ph idx="1"/>
+          </p:nvPr>
+        </p:nvSpPr>
+        <p:spPr/>
+        <p:txBody>
+          <a:bodyPr/>
+          <a:lstStyle/>
+          <a:p>
+            <a:endParaRPr lang="de-DE" dirty="0"/>
+          </a:p>
+        </p:txBody>
+      </p:sp>
     </p:spTree>
     <p:extLst>
       <p:ext uri="{BB962C8B-B14F-4D97-AF65-F5344CB8AC3E}">

</xml_diff>